<commit_message>
Updates to deck and fix ng2-2 example
</commit_message>
<xml_diff>
--- a/Likness - ng1 to ng2 - ATL Code Camp.pptx
+++ b/Likness - ng1 to ng2 - ATL Code Camp.pptx
@@ -4764,7 +4764,7 @@
           <a:p>
             <a:fld id="{FE5B4EDC-59C0-49C7-8ADA-5A781B329E02}" type="datetimeFigureOut">
               <a:rPr lang="en-US"/>
-              <a:t>10/9/2016</a:t>
+              <a:t>10/13/2016</a:t>
             </a:fld>
             <a:endParaRPr/>
           </a:p>
@@ -4929,7 +4929,7 @@
           <a:p>
             <a:fld id="{F2D8D46A-B586-417D-BFBD-8C8FE0AAF762}" type="datetimeFigureOut">
               <a:rPr lang="en-US"/>
-              <a:t>10/9/2016</a:t>
+              <a:t>10/13/2016</a:t>
             </a:fld>
             <a:endParaRPr/>
           </a:p>
@@ -6288,7 +6288,7 @@
           <a:p>
             <a:fld id="{F0DFD029-FB74-4578-B929-F66AA97659CA}" type="datetimeFigureOut">
               <a:rPr lang="en-US"/>
-              <a:t>10/9/2016</a:t>
+              <a:t>10/13/2016</a:t>
             </a:fld>
             <a:endParaRPr/>
           </a:p>
@@ -6486,7 +6486,7 @@
           <a:p>
             <a:fld id="{F0DFD029-FB74-4578-B929-F66AA97659CA}" type="datetimeFigureOut">
               <a:rPr lang="en-US"/>
-              <a:t>10/9/2016</a:t>
+              <a:t>10/13/2016</a:t>
             </a:fld>
             <a:endParaRPr/>
           </a:p>
@@ -6694,7 +6694,7 @@
           <a:p>
             <a:fld id="{F0DFD029-FB74-4578-B929-F66AA97659CA}" type="datetimeFigureOut">
               <a:rPr lang="en-US"/>
-              <a:t>10/9/2016</a:t>
+              <a:t>10/13/2016</a:t>
             </a:fld>
             <a:endParaRPr/>
           </a:p>
@@ -6892,7 +6892,7 @@
           <a:p>
             <a:fld id="{F0DFD029-FB74-4578-B929-F66AA97659CA}" type="datetimeFigureOut">
               <a:rPr lang="en-US"/>
-              <a:t>10/9/2016</a:t>
+              <a:t>10/13/2016</a:t>
             </a:fld>
             <a:endParaRPr/>
           </a:p>
@@ -7155,7 +7155,7 @@
           <a:p>
             <a:fld id="{F0DFD029-FB74-4578-B929-F66AA97659CA}" type="datetimeFigureOut">
               <a:rPr lang="en-US"/>
-              <a:t>10/9/2016</a:t>
+              <a:t>10/13/2016</a:t>
             </a:fld>
             <a:endParaRPr/>
           </a:p>
@@ -7628,7 +7628,7 @@
           <a:p>
             <a:fld id="{F0DFD029-FB74-4578-B929-F66AA97659CA}" type="datetimeFigureOut">
               <a:rPr lang="en-US"/>
-              <a:t>10/9/2016</a:t>
+              <a:t>10/13/2016</a:t>
             </a:fld>
             <a:endParaRPr/>
           </a:p>
@@ -8084,7 +8084,7 @@
           <a:p>
             <a:fld id="{F0DFD029-FB74-4578-B929-F66AA97659CA}" type="datetimeFigureOut">
               <a:rPr lang="en-US"/>
-              <a:t>10/9/2016</a:t>
+              <a:t>10/13/2016</a:t>
             </a:fld>
             <a:endParaRPr/>
           </a:p>
@@ -8214,7 +8214,7 @@
           <a:p>
             <a:fld id="{F0DFD029-FB74-4578-B929-F66AA97659CA}" type="datetimeFigureOut">
               <a:rPr lang="en-US"/>
-              <a:t>10/9/2016</a:t>
+              <a:t>10/13/2016</a:t>
             </a:fld>
             <a:endParaRPr/>
           </a:p>
@@ -8321,7 +8321,7 @@
           <a:p>
             <a:fld id="{F0DFD029-FB74-4578-B929-F66AA97659CA}" type="datetimeFigureOut">
               <a:rPr lang="en-US"/>
-              <a:t>10/9/2016</a:t>
+              <a:t>10/13/2016</a:t>
             </a:fld>
             <a:endParaRPr/>
           </a:p>
@@ -8620,7 +8620,7 @@
           <a:p>
             <a:fld id="{F0DFD029-FB74-4578-B929-F66AA97659CA}" type="datetimeFigureOut">
               <a:rPr lang="en-US"/>
-              <a:t>10/9/2016</a:t>
+              <a:t>10/13/2016</a:t>
             </a:fld>
             <a:endParaRPr/>
           </a:p>
@@ -8908,7 +8908,7 @@
           <a:p>
             <a:fld id="{F0DFD029-FB74-4578-B929-F66AA97659CA}" type="datetimeFigureOut">
               <a:rPr lang="en-US"/>
-              <a:t>10/9/2016</a:t>
+              <a:t>10/13/2016</a:t>
             </a:fld>
             <a:endParaRPr/>
           </a:p>
@@ -9531,7 +9531,7 @@
             <a:fld id="{F0DFD029-FB74-4578-B929-F66AA97659CA}" type="datetimeFigureOut">
               <a:rPr lang="en-US"/>
               <a:pPr/>
-              <a:t>10/9/2016</a:t>
+              <a:t>10/13/2016</a:t>
             </a:fld>
             <a:endParaRPr/>
           </a:p>
@@ -14155,7 +14155,12 @@
             <p:ph type="title"/>
           </p:nvPr>
         </p:nvSpPr>
-        <p:spPr/>
+        <p:spPr>
+          <a:xfrm>
+            <a:off x="1625177" y="457200"/>
+            <a:ext cx="8938472" cy="2764335"/>
+          </a:xfrm>
+        </p:spPr>
         <p:txBody>
           <a:bodyPr/>
           <a:lstStyle/>
@@ -14179,7 +14184,7 @@
         </p:nvSpPr>
         <p:spPr>
           <a:xfrm>
-            <a:off x="1625176" y="4951266"/>
+            <a:off x="1625176" y="3198665"/>
             <a:ext cx="10336636" cy="1220933"/>
           </a:xfrm>
         </p:spPr>
@@ -14199,7 +14204,7 @@
               <a:rPr lang="en-US" dirty="0">
                 <a:hlinkClick r:id="rId2"/>
               </a:rPr>
-              <a:t>https://github.com/JeremyLikness/Back2NgFuture/</a:t>
+              <a:t>https://github.com/JeremyLikness/atlcodecamp2016/</a:t>
             </a:r>
             <a:r>
               <a:rPr lang="en-US" dirty="0"/>
@@ -15314,9 +15319,12 @@
 </file>
 
 <file path=customXml/item1.xml><?xml version="1.0" encoding="utf-8"?>
-<p:properties xmlns:p="http://schemas.microsoft.com/office/2006/metadata/properties" xmlns:xsi="http://www.w3.org/2001/XMLSchema-instance" xmlns:pc="http://schemas.microsoft.com/office/infopath/2007/PartnerControls">
-  <documentManagement/>
-</p:properties>
+<?mso-contentType ?>
+<FormTemplates xmlns="http://schemas.microsoft.com/sharepoint/v3/contenttype/forms">
+  <Display>DocumentLibraryForm</Display>
+  <Edit>DocumentLibraryForm</Edit>
+  <New>DocumentLibraryForm</New>
+</FormTemplates>
 </file>
 
 <file path=customXml/item2.xml><?xml version="1.0" encoding="utf-8"?>
@@ -15434,25 +15442,15 @@
 </file>
 
 <file path=customXml/item3.xml><?xml version="1.0" encoding="utf-8"?>
-<?mso-contentType ?>
-<FormTemplates xmlns="http://schemas.microsoft.com/sharepoint/v3/contenttype/forms">
-  <Display>DocumentLibraryForm</Display>
-  <Edit>DocumentLibraryForm</Edit>
-  <New>DocumentLibraryForm</New>
-</FormTemplates>
+<p:properties xmlns:p="http://schemas.microsoft.com/office/2006/metadata/properties" xmlns:xsi="http://www.w3.org/2001/XMLSchema-instance" xmlns:pc="http://schemas.microsoft.com/office/infopath/2007/PartnerControls">
+  <documentManagement/>
+</p:properties>
 </file>
 
 <file path=customXml/itemProps1.xml><?xml version="1.0" encoding="utf-8"?>
-<ds:datastoreItem xmlns:ds="http://schemas.openxmlformats.org/officeDocument/2006/customXml" ds:itemID="{0DA53E90-B0BC-41E7-9D74-839139AAC3A3}">
+<ds:datastoreItem xmlns:ds="http://schemas.openxmlformats.org/officeDocument/2006/customXml" ds:itemID="{7F160FCB-B22C-4AC2-BAB9-C1F8DF3EFC60}">
   <ds:schemaRefs>
-    <ds:schemaRef ds:uri="http://purl.org/dc/terms/"/>
-    <ds:schemaRef ds:uri="http://schemas.openxmlformats.org/package/2006/metadata/core-properties"/>
-    <ds:schemaRef ds:uri="http://schemas.microsoft.com/office/2006/documentManagement/types"/>
-    <ds:schemaRef ds:uri="http://schemas.microsoft.com/office/infopath/2007/PartnerControls"/>
-    <ds:schemaRef ds:uri="http://purl.org/dc/elements/1.1/"/>
-    <ds:schemaRef ds:uri="http://schemas.microsoft.com/office/2006/metadata/properties"/>
-    <ds:schemaRef ds:uri="http://www.w3.org/XML/1998/namespace"/>
-    <ds:schemaRef ds:uri="http://purl.org/dc/dcmitype/"/>
+    <ds:schemaRef ds:uri="http://schemas.microsoft.com/sharepoint/v3/contenttype/forms"/>
   </ds:schemaRefs>
 </ds:datastoreItem>
 </file>
@@ -15474,9 +15472,16 @@
 </file>
 
 <file path=customXml/itemProps3.xml><?xml version="1.0" encoding="utf-8"?>
-<ds:datastoreItem xmlns:ds="http://schemas.openxmlformats.org/officeDocument/2006/customXml" ds:itemID="{7F160FCB-B22C-4AC2-BAB9-C1F8DF3EFC60}">
+<ds:datastoreItem xmlns:ds="http://schemas.openxmlformats.org/officeDocument/2006/customXml" ds:itemID="{0DA53E90-B0BC-41E7-9D74-839139AAC3A3}">
   <ds:schemaRefs>
-    <ds:schemaRef ds:uri="http://schemas.microsoft.com/sharepoint/v3/contenttype/forms"/>
+    <ds:schemaRef ds:uri="http://purl.org/dc/terms/"/>
+    <ds:schemaRef ds:uri="http://schemas.openxmlformats.org/package/2006/metadata/core-properties"/>
+    <ds:schemaRef ds:uri="http://schemas.microsoft.com/office/2006/documentManagement/types"/>
+    <ds:schemaRef ds:uri="http://schemas.microsoft.com/office/infopath/2007/PartnerControls"/>
+    <ds:schemaRef ds:uri="http://purl.org/dc/elements/1.1/"/>
+    <ds:schemaRef ds:uri="http://schemas.microsoft.com/office/2006/metadata/properties"/>
+    <ds:schemaRef ds:uri="http://www.w3.org/XML/1998/namespace"/>
+    <ds:schemaRef ds:uri="http://purl.org/dc/dcmitype/"/>
   </ds:schemaRefs>
 </ds:datastoreItem>
 </file>
</xml_diff>